<commit_message>
Add Twitter handle to the footer of every slide.
</commit_message>
<xml_diff>
--- a/presentation.pptx
+++ b/presentation.pptx
@@ -149,6 +149,11 @@
       </a:defRPr>
     </a:lvl9pPr>
   </p:defaultTextStyle>
+  <p:extLst>
+    <p:ext uri="{EFAFB233-063F-42B5-8137-9DF3F51BA10A}">
+      <p15:sldGuideLst xmlns:p15="http://schemas.microsoft.com/office/powerpoint/2012/main"/>
+    </p:ext>
+  </p:extLst>
 </p:presentation>
 </file>
 
@@ -234,7 +239,7 @@
           <a:p>
             <a:fld id="{DF040B07-607C-4776-A3EB-14E56E6FD383}" type="datetimeFigureOut">
               <a:rPr lang="en-US" smtClean="0"/>
-              <a:t>2012-08-11</a:t>
+              <a:t>2012-08-13</a:t>
             </a:fld>
             <a:endParaRPr lang="en-US"/>
           </a:p>
@@ -3035,30 +3040,10 @@
           <a:bodyPr/>
           <a:lstStyle/>
           <a:p>
-            <a:fld id="{B61BEF0D-F0BB-DE4B-95CE-6DB70DBA9567}" type="datetimeFigureOut">
-              <a:rPr lang="en-US"/>
-              <a:pPr/>
-              <a:t>2012-08-11</a:t>
+            <a:fld id="{BF7EDF94-63F6-4F94-B71D-30A8ECCA696D}" type="datetime1">
+              <a:rPr lang="en-US" smtClean="0"/>
+              <a:t>2012-08-13</a:t>
             </a:fld>
-            <a:endParaRPr lang="en-US"/>
-          </a:p>
-        </p:txBody>
-      </p:sp>
-      <p:sp>
-        <p:nvSpPr>
-          <p:cNvPr id="5" name="Footer Placeholder 4"/>
-          <p:cNvSpPr>
-            <a:spLocks noGrp="1"/>
-          </p:cNvSpPr>
-          <p:nvPr>
-            <p:ph type="ftr" sz="quarter" idx="11"/>
-          </p:nvPr>
-        </p:nvSpPr>
-        <p:spPr/>
-        <p:txBody>
-          <a:bodyPr/>
-          <a:lstStyle/>
-          <a:p>
             <a:endParaRPr lang="en-US"/>
           </a:p>
         </p:txBody>
@@ -3359,10 +3344,9 @@
           <a:bodyPr/>
           <a:lstStyle/>
           <a:p>
-            <a:fld id="{B61BEF0D-F0BB-DE4B-95CE-6DB70DBA9567}" type="datetimeFigureOut">
-              <a:rPr lang="en-US"/>
-              <a:pPr/>
-              <a:t>2012-08-11</a:t>
+            <a:fld id="{AC6431B7-5CB6-46C2-ADB8-9B68048941CC}" type="datetime1">
+              <a:rPr lang="en-US" smtClean="0"/>
+              <a:t>2012-08-13</a:t>
             </a:fld>
             <a:endParaRPr lang="en-US"/>
           </a:p>
@@ -3383,6 +3367,10 @@
           <a:bodyPr/>
           <a:lstStyle/>
           <a:p>
+            <a:r>
+              <a:rPr lang="en-US" smtClean="0"/>
+              <a:t>@domenic</a:t>
+            </a:r>
             <a:endParaRPr lang="en-US"/>
           </a:p>
         </p:txBody>
@@ -4485,10 +4473,9 @@
           <a:bodyPr/>
           <a:lstStyle/>
           <a:p>
-            <a:fld id="{B61BEF0D-F0BB-DE4B-95CE-6DB70DBA9567}" type="datetimeFigureOut">
-              <a:rPr lang="en-US"/>
-              <a:pPr/>
-              <a:t>2012-08-11</a:t>
+            <a:fld id="{C8ACD2F4-6EC7-4C11-83C2-AF59E0407C16}" type="datetime1">
+              <a:rPr lang="en-US" smtClean="0"/>
+              <a:t>2012-08-13</a:t>
             </a:fld>
             <a:endParaRPr lang="en-US"/>
           </a:p>
@@ -4509,6 +4496,10 @@
           <a:bodyPr/>
           <a:lstStyle/>
           <a:p>
+            <a:r>
+              <a:rPr lang="en-US" smtClean="0"/>
+              <a:t>@domenic</a:t>
+            </a:r>
             <a:endParaRPr lang="en-US"/>
           </a:p>
         </p:txBody>
@@ -5920,10 +5911,9 @@
           <a:bodyPr/>
           <a:lstStyle/>
           <a:p>
-            <a:fld id="{B61BEF0D-F0BB-DE4B-95CE-6DB70DBA9567}" type="datetimeFigureOut">
-              <a:rPr lang="en-US"/>
-              <a:pPr/>
-              <a:t>2012-08-11</a:t>
+            <a:fld id="{70B19A5F-12B3-4BA8-839E-3E5A24F31965}" type="datetime1">
+              <a:rPr lang="en-US" smtClean="0"/>
+              <a:t>2012-08-13</a:t>
             </a:fld>
             <a:endParaRPr lang="en-US"/>
           </a:p>
@@ -5944,6 +5934,10 @@
           <a:bodyPr/>
           <a:lstStyle/>
           <a:p>
+            <a:r>
+              <a:rPr lang="en-US" smtClean="0"/>
+              <a:t>@domenic</a:t>
+            </a:r>
             <a:endParaRPr lang="en-US"/>
           </a:p>
         </p:txBody>
@@ -7046,10 +7040,9 @@
           <a:bodyPr/>
           <a:lstStyle/>
           <a:p>
-            <a:fld id="{B61BEF0D-F0BB-DE4B-95CE-6DB70DBA9567}" type="datetimeFigureOut">
-              <a:rPr lang="en-US"/>
-              <a:pPr/>
-              <a:t>2012-08-11</a:t>
+            <a:fld id="{BDDBF607-AB04-4D83-A2A3-F6683DC2EE28}" type="datetime1">
+              <a:rPr lang="en-US" smtClean="0"/>
+              <a:t>2012-08-13</a:t>
             </a:fld>
             <a:endParaRPr lang="en-US"/>
           </a:p>
@@ -7070,6 +7063,10 @@
           <a:bodyPr/>
           <a:lstStyle/>
           <a:p>
+            <a:r>
+              <a:rPr lang="en-US" smtClean="0"/>
+              <a:t>@domenic</a:t>
+            </a:r>
             <a:endParaRPr lang="en-US"/>
           </a:p>
         </p:txBody>
@@ -8481,10 +8478,9 @@
           <a:bodyPr/>
           <a:lstStyle/>
           <a:p>
-            <a:fld id="{B61BEF0D-F0BB-DE4B-95CE-6DB70DBA9567}" type="datetimeFigureOut">
-              <a:rPr lang="en-US"/>
-              <a:pPr/>
-              <a:t>2012-08-11</a:t>
+            <a:fld id="{7D6F1343-CD33-4C6A-8174-89AC32DF4A71}" type="datetime1">
+              <a:rPr lang="en-US" smtClean="0"/>
+              <a:t>2012-08-13</a:t>
             </a:fld>
             <a:endParaRPr lang="en-US"/>
           </a:p>
@@ -8505,6 +8501,10 @@
           <a:bodyPr/>
           <a:lstStyle/>
           <a:p>
+            <a:r>
+              <a:rPr lang="en-US" smtClean="0"/>
+              <a:t>@domenic</a:t>
+            </a:r>
             <a:endParaRPr lang="en-US"/>
           </a:p>
         </p:txBody>
@@ -10383,10 +10383,9 @@
           <a:bodyPr/>
           <a:lstStyle/>
           <a:p>
-            <a:fld id="{B61BEF0D-F0BB-DE4B-95CE-6DB70DBA9567}" type="datetimeFigureOut">
-              <a:rPr lang="en-US"/>
-              <a:pPr/>
-              <a:t>2012-08-11</a:t>
+            <a:fld id="{12C7698C-20AF-49CE-B162-55E166B616BE}" type="datetime1">
+              <a:rPr lang="en-US" smtClean="0"/>
+              <a:t>2012-08-13</a:t>
             </a:fld>
             <a:endParaRPr lang="en-US"/>
           </a:p>
@@ -10407,6 +10406,10 @@
           <a:bodyPr/>
           <a:lstStyle/>
           <a:p>
+            <a:r>
+              <a:rPr lang="en-US" smtClean="0"/>
+              <a:t>@domenic</a:t>
+            </a:r>
             <a:endParaRPr lang="en-US"/>
           </a:p>
         </p:txBody>
@@ -10636,10 +10639,9 @@
           <a:bodyPr/>
           <a:lstStyle/>
           <a:p>
-            <a:fld id="{B61BEF0D-F0BB-DE4B-95CE-6DB70DBA9567}" type="datetimeFigureOut">
-              <a:rPr lang="en-US"/>
-              <a:pPr/>
-              <a:t>2012-08-11</a:t>
+            <a:fld id="{1DA95095-4B88-4822-B12D-842D98F99E8D}" type="datetime1">
+              <a:rPr lang="en-US" smtClean="0"/>
+              <a:t>2012-08-13</a:t>
             </a:fld>
             <a:endParaRPr lang="en-US"/>
           </a:p>
@@ -10660,6 +10662,10 @@
           <a:bodyPr/>
           <a:lstStyle/>
           <a:p>
+            <a:r>
+              <a:rPr lang="en-US" smtClean="0"/>
+              <a:t>@domenic</a:t>
+            </a:r>
             <a:endParaRPr lang="en-US"/>
           </a:p>
         </p:txBody>
@@ -12479,10 +12485,9 @@
           <a:bodyPr/>
           <a:lstStyle/>
           <a:p>
-            <a:fld id="{B61BEF0D-F0BB-DE4B-95CE-6DB70DBA9567}" type="datetimeFigureOut">
-              <a:rPr lang="en-US"/>
-              <a:pPr/>
-              <a:t>2012-08-11</a:t>
+            <a:fld id="{4EA239A6-C012-40FE-9304-6BE96EF94C2F}" type="datetime1">
+              <a:rPr lang="en-US" smtClean="0"/>
+              <a:t>2012-08-13</a:t>
             </a:fld>
             <a:endParaRPr lang="en-US"/>
           </a:p>
@@ -12503,6 +12508,10 @@
           <a:bodyPr/>
           <a:lstStyle/>
           <a:p>
+            <a:r>
+              <a:rPr lang="en-US" smtClean="0"/>
+              <a:t>@domenic</a:t>
+            </a:r>
             <a:endParaRPr lang="en-US"/>
           </a:p>
         </p:txBody>
@@ -12796,10 +12805,9 @@
           <a:bodyPr/>
           <a:lstStyle/>
           <a:p>
-            <a:fld id="{B61BEF0D-F0BB-DE4B-95CE-6DB70DBA9567}" type="datetimeFigureOut">
-              <a:rPr lang="en-US"/>
-              <a:pPr/>
-              <a:t>2012-08-11</a:t>
+            <a:fld id="{A1A96E9F-E753-4382-BC25-9E8CE44058A0}" type="datetime1">
+              <a:rPr lang="en-US" smtClean="0"/>
+              <a:t>2012-08-13</a:t>
             </a:fld>
             <a:endParaRPr lang="en-US"/>
           </a:p>
@@ -12820,6 +12828,10 @@
           <a:bodyPr/>
           <a:lstStyle/>
           <a:p>
+            <a:r>
+              <a:rPr lang="en-US" smtClean="0"/>
+              <a:t>@domenic</a:t>
+            </a:r>
             <a:endParaRPr lang="en-US"/>
           </a:p>
         </p:txBody>
@@ -14760,10 +14772,9 @@
           <a:bodyPr/>
           <a:lstStyle/>
           <a:p>
-            <a:fld id="{B61BEF0D-F0BB-DE4B-95CE-6DB70DBA9567}" type="datetimeFigureOut">
-              <a:rPr lang="en-US"/>
-              <a:pPr/>
-              <a:t>2012-08-11</a:t>
+            <a:fld id="{CF55043C-2D3B-401B-B9E9-E68DB214B312}" type="datetime1">
+              <a:rPr lang="en-US" smtClean="0"/>
+              <a:t>2012-08-13</a:t>
             </a:fld>
             <a:endParaRPr lang="en-US"/>
           </a:p>
@@ -14784,6 +14795,10 @@
           <a:bodyPr/>
           <a:lstStyle/>
           <a:p>
+            <a:r>
+              <a:rPr lang="en-US" smtClean="0"/>
+              <a:t>@domenic</a:t>
+            </a:r>
             <a:endParaRPr lang="en-US"/>
           </a:p>
         </p:txBody>
@@ -16060,10 +16075,9 @@
           <a:bodyPr/>
           <a:lstStyle/>
           <a:p>
-            <a:fld id="{B61BEF0D-F0BB-DE4B-95CE-6DB70DBA9567}" type="datetimeFigureOut">
-              <a:rPr lang="en-US"/>
-              <a:pPr/>
-              <a:t>2012-08-11</a:t>
+            <a:fld id="{35D7BC8C-3207-4EB7-B7A2-029BB870B2EA}" type="datetime1">
+              <a:rPr lang="en-US" smtClean="0"/>
+              <a:t>2012-08-13</a:t>
             </a:fld>
             <a:endParaRPr lang="en-US"/>
           </a:p>
@@ -16084,6 +16098,10 @@
           <a:bodyPr/>
           <a:lstStyle/>
           <a:p>
+            <a:r>
+              <a:rPr lang="en-US" smtClean="0"/>
+              <a:t>@domenic</a:t>
+            </a:r>
             <a:endParaRPr lang="en-US"/>
           </a:p>
         </p:txBody>
@@ -17053,10 +17071,9 @@
           <a:bodyPr/>
           <a:lstStyle/>
           <a:p>
-            <a:fld id="{B61BEF0D-F0BB-DE4B-95CE-6DB70DBA9567}" type="datetimeFigureOut">
-              <a:rPr lang="en-US"/>
-              <a:pPr/>
-              <a:t>2012-08-11</a:t>
+            <a:fld id="{384FD543-E235-4EF5-9C87-F7458C582F14}" type="datetime1">
+              <a:rPr lang="en-US" smtClean="0"/>
+              <a:t>2012-08-13</a:t>
             </a:fld>
             <a:endParaRPr lang="en-US"/>
           </a:p>
@@ -17077,6 +17094,10 @@
           <a:bodyPr/>
           <a:lstStyle/>
           <a:p>
+            <a:r>
+              <a:rPr lang="en-US" smtClean="0"/>
+              <a:t>@domenic</a:t>
+            </a:r>
             <a:endParaRPr lang="en-US"/>
           </a:p>
         </p:txBody>
@@ -17926,10 +17947,9 @@
           <a:bodyPr/>
           <a:lstStyle/>
           <a:p>
-            <a:fld id="{B61BEF0D-F0BB-DE4B-95CE-6DB70DBA9567}" type="datetimeFigureOut">
-              <a:rPr lang="en-US"/>
-              <a:pPr/>
-              <a:t>2012-08-11</a:t>
+            <a:fld id="{73F470D5-CF42-4235-9F73-3025FB98775F}" type="datetime1">
+              <a:rPr lang="en-US" smtClean="0"/>
+              <a:t>2012-08-13</a:t>
             </a:fld>
             <a:endParaRPr lang="en-US"/>
           </a:p>
@@ -17950,6 +17970,10 @@
           <a:bodyPr/>
           <a:lstStyle/>
           <a:p>
+            <a:r>
+              <a:rPr lang="en-US" smtClean="0"/>
+              <a:t>@domenic</a:t>
+            </a:r>
             <a:endParaRPr lang="en-US"/>
           </a:p>
         </p:txBody>
@@ -19167,10 +19191,9 @@
           <a:bodyPr/>
           <a:lstStyle/>
           <a:p>
-            <a:fld id="{B61BEF0D-F0BB-DE4B-95CE-6DB70DBA9567}" type="datetimeFigureOut">
-              <a:rPr lang="en-US"/>
-              <a:pPr/>
-              <a:t>2012-08-11</a:t>
+            <a:fld id="{D2F6FA99-DE97-4B89-A585-869280D1EB82}" type="datetime1">
+              <a:rPr lang="en-US" smtClean="0"/>
+              <a:t>2012-08-13</a:t>
             </a:fld>
             <a:endParaRPr lang="en-US"/>
           </a:p>
@@ -19191,6 +19214,10 @@
           <a:bodyPr/>
           <a:lstStyle/>
           <a:p>
+            <a:r>
+              <a:rPr lang="en-US" smtClean="0"/>
+              <a:t>@domenic</a:t>
+            </a:r>
             <a:endParaRPr lang="en-US"/>
           </a:p>
         </p:txBody>
@@ -20300,10 +20327,9 @@
           <a:bodyPr/>
           <a:lstStyle/>
           <a:p>
-            <a:fld id="{B61BEF0D-F0BB-DE4B-95CE-6DB70DBA9567}" type="datetimeFigureOut">
-              <a:rPr lang="en-US"/>
-              <a:pPr/>
-              <a:t>2012-08-11</a:t>
+            <a:fld id="{5ABE0CC7-8B2A-4942-BFA3-4888E75CACB9}" type="datetime1">
+              <a:rPr lang="en-US" smtClean="0"/>
+              <a:t>2012-08-13</a:t>
             </a:fld>
             <a:endParaRPr lang="en-US"/>
           </a:p>
@@ -20324,6 +20350,10 @@
           <a:bodyPr/>
           <a:lstStyle/>
           <a:p>
+            <a:r>
+              <a:rPr lang="en-US" smtClean="0"/>
+              <a:t>@domenic</a:t>
+            </a:r>
             <a:endParaRPr lang="en-US"/>
           </a:p>
         </p:txBody>
@@ -20510,10 +20540,9 @@
             </a:lvl1pPr>
           </a:lstStyle>
           <a:p>
-            <a:fld id="{B61BEF0D-F0BB-DE4B-95CE-6DB70DBA9567}" type="datetimeFigureOut">
+            <a:fld id="{87D9BBD7-B0D2-49A9-9337-5F906898ECE6}" type="datetime1">
               <a:rPr lang="en-US" smtClean="0"/>
-              <a:pPr/>
-              <a:t>2012-08-11</a:t>
+              <a:t>2012-08-13</a:t>
             </a:fld>
             <a:endParaRPr lang="en-US" dirty="0"/>
           </a:p>
@@ -20531,7 +20560,7 @@
         </p:nvSpPr>
         <p:spPr>
           <a:xfrm>
-            <a:off x="677334" y="6041362"/>
+            <a:off x="425288" y="6485129"/>
             <a:ext cx="6297612" cy="365125"/>
           </a:xfrm>
           <a:prstGeom prst="rect">
@@ -20542,7 +20571,7 @@
           <a:bodyPr vert="horz" lIns="91440" tIns="45720" rIns="91440" bIns="45720" rtlCol="0" anchor="ctr"/>
           <a:lstStyle>
             <a:lvl1pPr algn="l">
-              <a:defRPr sz="900">
+              <a:defRPr sz="2000">
                 <a:solidFill>
                   <a:schemeClr val="tx1">
                     <a:tint val="75000"/>
@@ -20552,6 +20581,14 @@
             </a:lvl1pPr>
           </a:lstStyle>
           <a:p>
+            <a:r>
+              <a:rPr lang="en-US" dirty="0" smtClean="0"/>
+              <a:t>@</a:t>
+            </a:r>
+            <a:r>
+              <a:rPr lang="en-US" dirty="0" err="1" smtClean="0"/>
+              <a:t>domenic</a:t>
+            </a:r>
             <a:endParaRPr lang="en-US" dirty="0"/>
           </a:p>
         </p:txBody>
@@ -20622,6 +20659,7 @@
     <p:sldLayoutId id="2147483658" r:id="rId15"/>
     <p:sldLayoutId id="2147483659" r:id="rId16"/>
   </p:sldLayoutIdLst>
+  <p:hf sldNum="0" hdr="0" dt="0"/>
   <p:txStyles>
     <p:titleStyle>
       <a:lvl1pPr algn="l" defTabSz="457200" rtl="0" eaLnBrk="1" latinLnBrk="0" hangingPunct="1">
@@ -21095,6 +21133,34 @@
           </a:prstGeom>
         </p:spPr>
       </p:pic>
+      <p:sp>
+        <p:nvSpPr>
+          <p:cNvPr id="3" name="Footer Placeholder 2"/>
+          <p:cNvSpPr>
+            <a:spLocks noGrp="1"/>
+          </p:cNvSpPr>
+          <p:nvPr>
+            <p:ph type="ftr" sz="quarter" idx="4294967295"/>
+          </p:nvPr>
+        </p:nvSpPr>
+        <p:spPr>
+          <a:xfrm>
+            <a:off x="327555" y="6485129"/>
+            <a:ext cx="6297612" cy="365125"/>
+          </a:xfrm>
+        </p:spPr>
+        <p:txBody>
+          <a:bodyPr/>
+          <a:lstStyle/>
+          <a:p>
+            <a:r>
+              <a:rPr lang="en-US" smtClean="0"/>
+              <a:t>@domenic</a:t>
+            </a:r>
+            <a:endParaRPr lang="en-US"/>
+          </a:p>
+        </p:txBody>
+      </p:sp>
     </p:spTree>
     <p:extLst>
       <p:ext uri="{BB962C8B-B14F-4D97-AF65-F5344CB8AC3E}">
@@ -21158,6 +21224,29 @@
           </a:prstGeom>
         </p:spPr>
       </p:pic>
+      <p:sp>
+        <p:nvSpPr>
+          <p:cNvPr id="2" name="Footer Placeholder 1"/>
+          <p:cNvSpPr>
+            <a:spLocks noGrp="1"/>
+          </p:cNvSpPr>
+          <p:nvPr>
+            <p:ph type="ftr" sz="quarter" idx="11"/>
+          </p:nvPr>
+        </p:nvSpPr>
+        <p:spPr/>
+        <p:txBody>
+          <a:bodyPr/>
+          <a:lstStyle/>
+          <a:p>
+            <a:r>
+              <a:rPr lang="en-US" smtClean="0"/>
+              <a:t>@domenic</a:t>
+            </a:r>
+            <a:endParaRPr lang="en-US"/>
+          </a:p>
+        </p:txBody>
+      </p:sp>
     </p:spTree>
     <p:extLst>
       <p:ext uri="{BB962C8B-B14F-4D97-AF65-F5344CB8AC3E}">
@@ -21219,6 +21308,29 @@
           </a:p>
         </p:txBody>
       </p:sp>
+      <p:sp>
+        <p:nvSpPr>
+          <p:cNvPr id="3" name="Footer Placeholder 2"/>
+          <p:cNvSpPr>
+            <a:spLocks noGrp="1"/>
+          </p:cNvSpPr>
+          <p:nvPr>
+            <p:ph type="ftr" sz="quarter" idx="11"/>
+          </p:nvPr>
+        </p:nvSpPr>
+        <p:spPr/>
+        <p:txBody>
+          <a:bodyPr/>
+          <a:lstStyle/>
+          <a:p>
+            <a:r>
+              <a:rPr lang="en-US" smtClean="0"/>
+              <a:t>@domenic</a:t>
+            </a:r>
+            <a:endParaRPr lang="en-US"/>
+          </a:p>
+        </p:txBody>
+      </p:sp>
     </p:spTree>
     <p:extLst>
       <p:ext uri="{BB962C8B-B14F-4D97-AF65-F5344CB8AC3E}">
@@ -21325,6 +21437,29 @@
               <a:latin typeface="Segoe UI Light" panose="020B0502040204020203" pitchFamily="34" charset="0"/>
               <a:cs typeface="Segoe UI Light" panose="020B0502040204020203" pitchFamily="34" charset="0"/>
             </a:endParaRPr>
+          </a:p>
+        </p:txBody>
+      </p:sp>
+      <p:sp>
+        <p:nvSpPr>
+          <p:cNvPr id="3" name="Footer Placeholder 2"/>
+          <p:cNvSpPr>
+            <a:spLocks noGrp="1"/>
+          </p:cNvSpPr>
+          <p:nvPr>
+            <p:ph type="ftr" sz="quarter" idx="11"/>
+          </p:nvPr>
+        </p:nvSpPr>
+        <p:spPr/>
+        <p:txBody>
+          <a:bodyPr/>
+          <a:lstStyle/>
+          <a:p>
+            <a:r>
+              <a:rPr lang="en-US" smtClean="0"/>
+              <a:t>@domenic</a:t>
+            </a:r>
+            <a:endParaRPr lang="en-US"/>
           </a:p>
         </p:txBody>
       </p:sp>
@@ -21479,6 +21614,29 @@
           </a:p>
         </p:txBody>
       </p:sp>
+      <p:sp>
+        <p:nvSpPr>
+          <p:cNvPr id="3" name="Footer Placeholder 2"/>
+          <p:cNvSpPr>
+            <a:spLocks noGrp="1"/>
+          </p:cNvSpPr>
+          <p:nvPr>
+            <p:ph type="ftr" sz="quarter" idx="11"/>
+          </p:nvPr>
+        </p:nvSpPr>
+        <p:spPr/>
+        <p:txBody>
+          <a:bodyPr/>
+          <a:lstStyle/>
+          <a:p>
+            <a:r>
+              <a:rPr lang="en-US" smtClean="0"/>
+              <a:t>@domenic</a:t>
+            </a:r>
+            <a:endParaRPr lang="en-US"/>
+          </a:p>
+        </p:txBody>
+      </p:sp>
     </p:spTree>
     <p:extLst>
       <p:ext uri="{BB962C8B-B14F-4D97-AF65-F5344CB8AC3E}">
@@ -21642,6 +21800,29 @@
           </a:p>
         </p:txBody>
       </p:sp>
+      <p:sp>
+        <p:nvSpPr>
+          <p:cNvPr id="3" name="Footer Placeholder 2"/>
+          <p:cNvSpPr>
+            <a:spLocks noGrp="1"/>
+          </p:cNvSpPr>
+          <p:nvPr>
+            <p:ph type="ftr" sz="quarter" idx="11"/>
+          </p:nvPr>
+        </p:nvSpPr>
+        <p:spPr/>
+        <p:txBody>
+          <a:bodyPr/>
+          <a:lstStyle/>
+          <a:p>
+            <a:r>
+              <a:rPr lang="en-US" smtClean="0"/>
+              <a:t>@domenic</a:t>
+            </a:r>
+            <a:endParaRPr lang="en-US"/>
+          </a:p>
+        </p:txBody>
+      </p:sp>
     </p:spTree>
     <p:extLst>
       <p:ext uri="{BB962C8B-B14F-4D97-AF65-F5344CB8AC3E}">
@@ -21824,6 +22005,29 @@
           </a:p>
         </p:txBody>
       </p:sp>
+      <p:sp>
+        <p:nvSpPr>
+          <p:cNvPr id="3" name="Footer Placeholder 2"/>
+          <p:cNvSpPr>
+            <a:spLocks noGrp="1"/>
+          </p:cNvSpPr>
+          <p:nvPr>
+            <p:ph type="ftr" sz="quarter" idx="11"/>
+          </p:nvPr>
+        </p:nvSpPr>
+        <p:spPr/>
+        <p:txBody>
+          <a:bodyPr/>
+          <a:lstStyle/>
+          <a:p>
+            <a:r>
+              <a:rPr lang="en-US" smtClean="0"/>
+              <a:t>@domenic</a:t>
+            </a:r>
+            <a:endParaRPr lang="en-US"/>
+          </a:p>
+        </p:txBody>
+      </p:sp>
     </p:spTree>
     <p:extLst>
       <p:ext uri="{BB962C8B-B14F-4D97-AF65-F5344CB8AC3E}">
@@ -21991,6 +22195,29 @@
           </a:p>
         </p:txBody>
       </p:sp>
+      <p:sp>
+        <p:nvSpPr>
+          <p:cNvPr id="3" name="Footer Placeholder 2"/>
+          <p:cNvSpPr>
+            <a:spLocks noGrp="1"/>
+          </p:cNvSpPr>
+          <p:nvPr>
+            <p:ph type="ftr" sz="quarter" idx="11"/>
+          </p:nvPr>
+        </p:nvSpPr>
+        <p:spPr/>
+        <p:txBody>
+          <a:bodyPr/>
+          <a:lstStyle/>
+          <a:p>
+            <a:r>
+              <a:rPr lang="en-US" smtClean="0"/>
+              <a:t>@domenic</a:t>
+            </a:r>
+            <a:endParaRPr lang="en-US"/>
+          </a:p>
+        </p:txBody>
+      </p:sp>
     </p:spTree>
     <p:extLst>
       <p:ext uri="{BB962C8B-B14F-4D97-AF65-F5344CB8AC3E}">
@@ -22074,6 +22301,29 @@
               <a:latin typeface="Segoe UI Light" panose="020B0502040204020203" pitchFamily="34" charset="0"/>
               <a:cs typeface="Segoe UI Light" panose="020B0502040204020203" pitchFamily="34" charset="0"/>
             </a:endParaRPr>
+          </a:p>
+        </p:txBody>
+      </p:sp>
+      <p:sp>
+        <p:nvSpPr>
+          <p:cNvPr id="3" name="Footer Placeholder 2"/>
+          <p:cNvSpPr>
+            <a:spLocks noGrp="1"/>
+          </p:cNvSpPr>
+          <p:nvPr>
+            <p:ph type="ftr" sz="quarter" idx="11"/>
+          </p:nvPr>
+        </p:nvSpPr>
+        <p:spPr/>
+        <p:txBody>
+          <a:bodyPr/>
+          <a:lstStyle/>
+          <a:p>
+            <a:r>
+              <a:rPr lang="en-US" smtClean="0"/>
+              <a:t>@domenic</a:t>
+            </a:r>
+            <a:endParaRPr lang="en-US"/>
           </a:p>
         </p:txBody>
       </p:sp>
@@ -22220,6 +22470,29 @@
           </a:extLst>
         </p:spPr>
       </p:pic>
+      <p:sp>
+        <p:nvSpPr>
+          <p:cNvPr id="3" name="Footer Placeholder 2"/>
+          <p:cNvSpPr>
+            <a:spLocks noGrp="1"/>
+          </p:cNvSpPr>
+          <p:nvPr>
+            <p:ph type="ftr" sz="quarter" idx="11"/>
+          </p:nvPr>
+        </p:nvSpPr>
+        <p:spPr/>
+        <p:txBody>
+          <a:bodyPr/>
+          <a:lstStyle/>
+          <a:p>
+            <a:r>
+              <a:rPr lang="en-US" smtClean="0"/>
+              <a:t>@domenic</a:t>
+            </a:r>
+            <a:endParaRPr lang="en-US"/>
+          </a:p>
+        </p:txBody>
+      </p:sp>
     </p:spTree>
     <p:extLst>
       <p:ext uri="{BB962C8B-B14F-4D97-AF65-F5344CB8AC3E}">
@@ -22455,6 +22728,29 @@
           </a:p>
         </p:txBody>
       </p:sp>
+      <p:sp>
+        <p:nvSpPr>
+          <p:cNvPr id="3" name="Footer Placeholder 2"/>
+          <p:cNvSpPr>
+            <a:spLocks noGrp="1"/>
+          </p:cNvSpPr>
+          <p:nvPr>
+            <p:ph type="ftr" sz="quarter" idx="11"/>
+          </p:nvPr>
+        </p:nvSpPr>
+        <p:spPr/>
+        <p:txBody>
+          <a:bodyPr/>
+          <a:lstStyle/>
+          <a:p>
+            <a:r>
+              <a:rPr lang="en-US" smtClean="0"/>
+              <a:t>@domenic</a:t>
+            </a:r>
+            <a:endParaRPr lang="en-US"/>
+          </a:p>
+        </p:txBody>
+      </p:sp>
     </p:spTree>
     <p:extLst>
       <p:ext uri="{BB962C8B-B14F-4D97-AF65-F5344CB8AC3E}">
@@ -22638,6 +22934,29 @@
           </a:prstGeom>
         </p:spPr>
       </p:pic>
+      <p:sp>
+        <p:nvSpPr>
+          <p:cNvPr id="3" name="Footer Placeholder 2"/>
+          <p:cNvSpPr>
+            <a:spLocks noGrp="1"/>
+          </p:cNvSpPr>
+          <p:nvPr>
+            <p:ph type="ftr" sz="quarter" idx="11"/>
+          </p:nvPr>
+        </p:nvSpPr>
+        <p:spPr/>
+        <p:txBody>
+          <a:bodyPr/>
+          <a:lstStyle/>
+          <a:p>
+            <a:r>
+              <a:rPr lang="en-US" smtClean="0"/>
+              <a:t>@domenic</a:t>
+            </a:r>
+            <a:endParaRPr lang="en-US"/>
+          </a:p>
+        </p:txBody>
+      </p:sp>
     </p:spTree>
     <p:extLst>
       <p:ext uri="{BB962C8B-B14F-4D97-AF65-F5344CB8AC3E}">
@@ -22648,11 +22967,11 @@
   <p:clrMapOvr>
     <a:masterClrMapping/>
   </p:clrMapOvr>
-  <mc:AlternateContent xmlns:mc="http://schemas.openxmlformats.org/markup-compatibility/2006">
-    <mc:Choice xmlns:p14="http://schemas.microsoft.com/office/powerpoint/2010/main" Requires="p14">
+  <mc:AlternateContent xmlns:mc="http://schemas.openxmlformats.org/markup-compatibility/2006" xmlns:p14="http://schemas.microsoft.com/office/powerpoint/2010/main">
+    <mc:Choice Requires="p14">
       <p:transition p14:dur="10"/>
     </mc:Choice>
-    <mc:Fallback>
+    <mc:Fallback xmlns="">
       <p:transition/>
     </mc:Fallback>
   </mc:AlternateContent>
@@ -22801,6 +23120,29 @@
           </a:p>
         </p:txBody>
       </p:sp>
+      <p:sp>
+        <p:nvSpPr>
+          <p:cNvPr id="3" name="Footer Placeholder 2"/>
+          <p:cNvSpPr>
+            <a:spLocks noGrp="1"/>
+          </p:cNvSpPr>
+          <p:nvPr>
+            <p:ph type="ftr" sz="quarter" idx="11"/>
+          </p:nvPr>
+        </p:nvSpPr>
+        <p:spPr/>
+        <p:txBody>
+          <a:bodyPr/>
+          <a:lstStyle/>
+          <a:p>
+            <a:r>
+              <a:rPr lang="en-US" smtClean="0"/>
+              <a:t>@domenic</a:t>
+            </a:r>
+            <a:endParaRPr lang="en-US"/>
+          </a:p>
+        </p:txBody>
+      </p:sp>
     </p:spTree>
     <p:extLst>
       <p:ext uri="{BB962C8B-B14F-4D97-AF65-F5344CB8AC3E}">
@@ -22889,6 +23231,29 @@
           </a:p>
         </p:txBody>
       </p:sp>
+      <p:sp>
+        <p:nvSpPr>
+          <p:cNvPr id="3" name="Footer Placeholder 2"/>
+          <p:cNvSpPr>
+            <a:spLocks noGrp="1"/>
+          </p:cNvSpPr>
+          <p:nvPr>
+            <p:ph type="ftr" sz="quarter" idx="11"/>
+          </p:nvPr>
+        </p:nvSpPr>
+        <p:spPr/>
+        <p:txBody>
+          <a:bodyPr/>
+          <a:lstStyle/>
+          <a:p>
+            <a:r>
+              <a:rPr lang="en-US" smtClean="0"/>
+              <a:t>@domenic</a:t>
+            </a:r>
+            <a:endParaRPr lang="en-US"/>
+          </a:p>
+        </p:txBody>
+      </p:sp>
     </p:spTree>
     <p:extLst>
       <p:ext uri="{BB962C8B-B14F-4D97-AF65-F5344CB8AC3E}">
@@ -23002,6 +23367,29 @@
               <a:latin typeface="Segoe UI Light" panose="020B0502040204020203" pitchFamily="34" charset="0"/>
               <a:cs typeface="Segoe UI Light" panose="020B0502040204020203" pitchFamily="34" charset="0"/>
             </a:endParaRPr>
+          </a:p>
+        </p:txBody>
+      </p:sp>
+      <p:sp>
+        <p:nvSpPr>
+          <p:cNvPr id="3" name="Footer Placeholder 2"/>
+          <p:cNvSpPr>
+            <a:spLocks noGrp="1"/>
+          </p:cNvSpPr>
+          <p:nvPr>
+            <p:ph type="ftr" sz="quarter" idx="11"/>
+          </p:nvPr>
+        </p:nvSpPr>
+        <p:spPr/>
+        <p:txBody>
+          <a:bodyPr/>
+          <a:lstStyle/>
+          <a:p>
+            <a:r>
+              <a:rPr lang="en-US" smtClean="0"/>
+              <a:t>@domenic</a:t>
+            </a:r>
+            <a:endParaRPr lang="en-US"/>
           </a:p>
         </p:txBody>
       </p:sp>
@@ -23390,6 +23778,29 @@
           </a:p>
         </p:txBody>
       </p:sp>
+      <p:sp>
+        <p:nvSpPr>
+          <p:cNvPr id="2" name="Footer Placeholder 1"/>
+          <p:cNvSpPr>
+            <a:spLocks noGrp="1"/>
+          </p:cNvSpPr>
+          <p:nvPr>
+            <p:ph type="ftr" sz="quarter" idx="11"/>
+          </p:nvPr>
+        </p:nvSpPr>
+        <p:spPr/>
+        <p:txBody>
+          <a:bodyPr/>
+          <a:lstStyle/>
+          <a:p>
+            <a:r>
+              <a:rPr lang="en-US" smtClean="0"/>
+              <a:t>@domenic</a:t>
+            </a:r>
+            <a:endParaRPr lang="en-US"/>
+          </a:p>
+        </p:txBody>
+      </p:sp>
     </p:spTree>
     <p:extLst>
       <p:ext uri="{BB962C8B-B14F-4D97-AF65-F5344CB8AC3E}">
@@ -23483,6 +23894,29 @@
           </a:p>
         </p:txBody>
       </p:sp>
+      <p:sp>
+        <p:nvSpPr>
+          <p:cNvPr id="3" name="Footer Placeholder 2"/>
+          <p:cNvSpPr>
+            <a:spLocks noGrp="1"/>
+          </p:cNvSpPr>
+          <p:nvPr>
+            <p:ph type="ftr" sz="quarter" idx="11"/>
+          </p:nvPr>
+        </p:nvSpPr>
+        <p:spPr/>
+        <p:txBody>
+          <a:bodyPr/>
+          <a:lstStyle/>
+          <a:p>
+            <a:r>
+              <a:rPr lang="en-US" smtClean="0"/>
+              <a:t>@domenic</a:t>
+            </a:r>
+            <a:endParaRPr lang="en-US"/>
+          </a:p>
+        </p:txBody>
+      </p:sp>
     </p:spTree>
     <p:extLst>
       <p:ext uri="{BB962C8B-B14F-4D97-AF65-F5344CB8AC3E}">
@@ -23576,6 +24010,29 @@
           </a:p>
         </p:txBody>
       </p:sp>
+      <p:sp>
+        <p:nvSpPr>
+          <p:cNvPr id="3" name="Footer Placeholder 2"/>
+          <p:cNvSpPr>
+            <a:spLocks noGrp="1"/>
+          </p:cNvSpPr>
+          <p:nvPr>
+            <p:ph type="ftr" sz="quarter" idx="11"/>
+          </p:nvPr>
+        </p:nvSpPr>
+        <p:spPr/>
+        <p:txBody>
+          <a:bodyPr/>
+          <a:lstStyle/>
+          <a:p>
+            <a:r>
+              <a:rPr lang="en-US" smtClean="0"/>
+              <a:t>@domenic</a:t>
+            </a:r>
+            <a:endParaRPr lang="en-US"/>
+          </a:p>
+        </p:txBody>
+      </p:sp>
     </p:spTree>
     <p:extLst>
       <p:ext uri="{BB962C8B-B14F-4D97-AF65-F5344CB8AC3E}">
@@ -23683,6 +24140,29 @@
           </a:p>
         </p:txBody>
       </p:sp>
+      <p:sp>
+        <p:nvSpPr>
+          <p:cNvPr id="3" name="Footer Placeholder 2"/>
+          <p:cNvSpPr>
+            <a:spLocks noGrp="1"/>
+          </p:cNvSpPr>
+          <p:nvPr>
+            <p:ph type="ftr" sz="quarter" idx="11"/>
+          </p:nvPr>
+        </p:nvSpPr>
+        <p:spPr/>
+        <p:txBody>
+          <a:bodyPr/>
+          <a:lstStyle/>
+          <a:p>
+            <a:r>
+              <a:rPr lang="en-US" smtClean="0"/>
+              <a:t>@domenic</a:t>
+            </a:r>
+            <a:endParaRPr lang="en-US"/>
+          </a:p>
+        </p:txBody>
+      </p:sp>
     </p:spTree>
     <p:extLst>
       <p:ext uri="{BB962C8B-B14F-4D97-AF65-F5344CB8AC3E}">
@@ -23784,6 +24264,29 @@
           </a:p>
         </p:txBody>
       </p:sp>
+      <p:sp>
+        <p:nvSpPr>
+          <p:cNvPr id="3" name="Footer Placeholder 2"/>
+          <p:cNvSpPr>
+            <a:spLocks noGrp="1"/>
+          </p:cNvSpPr>
+          <p:nvPr>
+            <p:ph type="ftr" sz="quarter" idx="11"/>
+          </p:nvPr>
+        </p:nvSpPr>
+        <p:spPr/>
+        <p:txBody>
+          <a:bodyPr/>
+          <a:lstStyle/>
+          <a:p>
+            <a:r>
+              <a:rPr lang="en-US" smtClean="0"/>
+              <a:t>@domenic</a:t>
+            </a:r>
+            <a:endParaRPr lang="en-US"/>
+          </a:p>
+        </p:txBody>
+      </p:sp>
     </p:spTree>
     <p:extLst>
       <p:ext uri="{BB962C8B-B14F-4D97-AF65-F5344CB8AC3E}">
@@ -23970,6 +24473,29 @@
           </a:p>
         </p:txBody>
       </p:sp>
+      <p:sp>
+        <p:nvSpPr>
+          <p:cNvPr id="3" name="Footer Placeholder 2"/>
+          <p:cNvSpPr>
+            <a:spLocks noGrp="1"/>
+          </p:cNvSpPr>
+          <p:nvPr>
+            <p:ph type="ftr" sz="quarter" idx="11"/>
+          </p:nvPr>
+        </p:nvSpPr>
+        <p:spPr/>
+        <p:txBody>
+          <a:bodyPr/>
+          <a:lstStyle/>
+          <a:p>
+            <a:r>
+              <a:rPr lang="en-US" smtClean="0"/>
+              <a:t>@domenic</a:t>
+            </a:r>
+            <a:endParaRPr lang="en-US"/>
+          </a:p>
+        </p:txBody>
+      </p:sp>
     </p:spTree>
     <p:extLst>
       <p:ext uri="{BB962C8B-B14F-4D97-AF65-F5344CB8AC3E}">
@@ -24043,6 +24569,29 @@
           </a:p>
         </p:txBody>
       </p:sp>
+      <p:sp>
+        <p:nvSpPr>
+          <p:cNvPr id="3" name="Footer Placeholder 2"/>
+          <p:cNvSpPr>
+            <a:spLocks noGrp="1"/>
+          </p:cNvSpPr>
+          <p:nvPr>
+            <p:ph type="ftr" sz="quarter" idx="11"/>
+          </p:nvPr>
+        </p:nvSpPr>
+        <p:spPr/>
+        <p:txBody>
+          <a:bodyPr/>
+          <a:lstStyle/>
+          <a:p>
+            <a:r>
+              <a:rPr lang="en-US" smtClean="0"/>
+              <a:t>@domenic</a:t>
+            </a:r>
+            <a:endParaRPr lang="en-US"/>
+          </a:p>
+        </p:txBody>
+      </p:sp>
     </p:spTree>
     <p:extLst>
       <p:ext uri="{BB962C8B-B14F-4D97-AF65-F5344CB8AC3E}">
@@ -24129,6 +24678,29 @@
           </a:prstGeom>
         </p:spPr>
       </p:pic>
+      <p:sp>
+        <p:nvSpPr>
+          <p:cNvPr id="3" name="Footer Placeholder 2"/>
+          <p:cNvSpPr>
+            <a:spLocks noGrp="1"/>
+          </p:cNvSpPr>
+          <p:nvPr>
+            <p:ph type="ftr" sz="quarter" idx="11"/>
+          </p:nvPr>
+        </p:nvSpPr>
+        <p:spPr/>
+        <p:txBody>
+          <a:bodyPr/>
+          <a:lstStyle/>
+          <a:p>
+            <a:r>
+              <a:rPr lang="en-US" smtClean="0"/>
+              <a:t>@domenic</a:t>
+            </a:r>
+            <a:endParaRPr lang="en-US"/>
+          </a:p>
+        </p:txBody>
+      </p:sp>
     </p:spTree>
     <p:extLst>
       <p:ext uri="{BB962C8B-B14F-4D97-AF65-F5344CB8AC3E}">
@@ -24251,6 +24823,29 @@
           </a:p>
         </p:txBody>
       </p:sp>
+      <p:sp>
+        <p:nvSpPr>
+          <p:cNvPr id="3" name="Footer Placeholder 2"/>
+          <p:cNvSpPr>
+            <a:spLocks noGrp="1"/>
+          </p:cNvSpPr>
+          <p:nvPr>
+            <p:ph type="ftr" sz="quarter" idx="11"/>
+          </p:nvPr>
+        </p:nvSpPr>
+        <p:spPr/>
+        <p:txBody>
+          <a:bodyPr/>
+          <a:lstStyle/>
+          <a:p>
+            <a:r>
+              <a:rPr lang="en-US" smtClean="0"/>
+              <a:t>@domenic</a:t>
+            </a:r>
+            <a:endParaRPr lang="en-US"/>
+          </a:p>
+        </p:txBody>
+      </p:sp>
     </p:spTree>
     <p:extLst>
       <p:ext uri="{BB962C8B-B14F-4D97-AF65-F5344CB8AC3E}">
@@ -24359,6 +24954,29 @@
           </a:p>
         </p:txBody>
       </p:sp>
+      <p:sp>
+        <p:nvSpPr>
+          <p:cNvPr id="3" name="Footer Placeholder 2"/>
+          <p:cNvSpPr>
+            <a:spLocks noGrp="1"/>
+          </p:cNvSpPr>
+          <p:nvPr>
+            <p:ph type="ftr" sz="quarter" idx="11"/>
+          </p:nvPr>
+        </p:nvSpPr>
+        <p:spPr/>
+        <p:txBody>
+          <a:bodyPr/>
+          <a:lstStyle/>
+          <a:p>
+            <a:r>
+              <a:rPr lang="en-US" smtClean="0"/>
+              <a:t>@domenic</a:t>
+            </a:r>
+            <a:endParaRPr lang="en-US"/>
+          </a:p>
+        </p:txBody>
+      </p:sp>
     </p:spTree>
     <p:extLst>
       <p:ext uri="{BB962C8B-B14F-4D97-AF65-F5344CB8AC3E}">
@@ -24513,6 +25131,29 @@
           </a:p>
         </p:txBody>
       </p:sp>
+      <p:sp>
+        <p:nvSpPr>
+          <p:cNvPr id="3" name="Footer Placeholder 2"/>
+          <p:cNvSpPr>
+            <a:spLocks noGrp="1"/>
+          </p:cNvSpPr>
+          <p:nvPr>
+            <p:ph type="ftr" sz="quarter" idx="11"/>
+          </p:nvPr>
+        </p:nvSpPr>
+        <p:spPr/>
+        <p:txBody>
+          <a:bodyPr/>
+          <a:lstStyle/>
+          <a:p>
+            <a:r>
+              <a:rPr lang="en-US" smtClean="0"/>
+              <a:t>@domenic</a:t>
+            </a:r>
+            <a:endParaRPr lang="en-US"/>
+          </a:p>
+        </p:txBody>
+      </p:sp>
     </p:spTree>
     <p:extLst>
       <p:ext uri="{BB962C8B-B14F-4D97-AF65-F5344CB8AC3E}">
@@ -24662,6 +25303,29 @@
           </a:p>
         </p:txBody>
       </p:sp>
+      <p:sp>
+        <p:nvSpPr>
+          <p:cNvPr id="3" name="Footer Placeholder 2"/>
+          <p:cNvSpPr>
+            <a:spLocks noGrp="1"/>
+          </p:cNvSpPr>
+          <p:nvPr>
+            <p:ph type="ftr" sz="quarter" idx="11"/>
+          </p:nvPr>
+        </p:nvSpPr>
+        <p:spPr/>
+        <p:txBody>
+          <a:bodyPr/>
+          <a:lstStyle/>
+          <a:p>
+            <a:r>
+              <a:rPr lang="en-US" smtClean="0"/>
+              <a:t>@domenic</a:t>
+            </a:r>
+            <a:endParaRPr lang="en-US"/>
+          </a:p>
+        </p:txBody>
+      </p:sp>
     </p:spTree>
     <p:extLst>
       <p:ext uri="{BB962C8B-B14F-4D97-AF65-F5344CB8AC3E}">
@@ -24723,6 +25387,29 @@
           </a:p>
         </p:txBody>
       </p:sp>
+      <p:sp>
+        <p:nvSpPr>
+          <p:cNvPr id="3" name="Footer Placeholder 2"/>
+          <p:cNvSpPr>
+            <a:spLocks noGrp="1"/>
+          </p:cNvSpPr>
+          <p:nvPr>
+            <p:ph type="ftr" sz="quarter" idx="11"/>
+          </p:nvPr>
+        </p:nvSpPr>
+        <p:spPr/>
+        <p:txBody>
+          <a:bodyPr/>
+          <a:lstStyle/>
+          <a:p>
+            <a:r>
+              <a:rPr lang="en-US" smtClean="0"/>
+              <a:t>@domenic</a:t>
+            </a:r>
+            <a:endParaRPr lang="en-US"/>
+          </a:p>
+        </p:txBody>
+      </p:sp>
     </p:spTree>
     <p:extLst>
       <p:ext uri="{BB962C8B-B14F-4D97-AF65-F5344CB8AC3E}">
@@ -25251,6 +25938,29 @@
           </a:p>
         </p:txBody>
       </p:sp>
+      <p:sp>
+        <p:nvSpPr>
+          <p:cNvPr id="2" name="Footer Placeholder 1"/>
+          <p:cNvSpPr>
+            <a:spLocks noGrp="1"/>
+          </p:cNvSpPr>
+          <p:nvPr>
+            <p:ph type="ftr" sz="quarter" idx="11"/>
+          </p:nvPr>
+        </p:nvSpPr>
+        <p:spPr/>
+        <p:txBody>
+          <a:bodyPr/>
+          <a:lstStyle/>
+          <a:p>
+            <a:r>
+              <a:rPr lang="en-US" smtClean="0"/>
+              <a:t>@domenic</a:t>
+            </a:r>
+            <a:endParaRPr lang="en-US"/>
+          </a:p>
+        </p:txBody>
+      </p:sp>
     </p:spTree>
     <p:extLst>
       <p:ext uri="{BB962C8B-B14F-4D97-AF65-F5344CB8AC3E}">
@@ -25339,6 +26049,29 @@
           </a:p>
         </p:txBody>
       </p:sp>
+      <p:sp>
+        <p:nvSpPr>
+          <p:cNvPr id="3" name="Footer Placeholder 2"/>
+          <p:cNvSpPr>
+            <a:spLocks noGrp="1"/>
+          </p:cNvSpPr>
+          <p:nvPr>
+            <p:ph type="ftr" sz="quarter" idx="11"/>
+          </p:nvPr>
+        </p:nvSpPr>
+        <p:spPr/>
+        <p:txBody>
+          <a:bodyPr/>
+          <a:lstStyle/>
+          <a:p>
+            <a:r>
+              <a:rPr lang="en-US" smtClean="0"/>
+              <a:t>@domenic</a:t>
+            </a:r>
+            <a:endParaRPr lang="en-US"/>
+          </a:p>
+        </p:txBody>
+      </p:sp>
     </p:spTree>
     <p:extLst>
       <p:ext uri="{BB962C8B-B14F-4D97-AF65-F5344CB8AC3E}">
@@ -25400,6 +26133,29 @@
           </a:p>
         </p:txBody>
       </p:sp>
+      <p:sp>
+        <p:nvSpPr>
+          <p:cNvPr id="3" name="Footer Placeholder 2"/>
+          <p:cNvSpPr>
+            <a:spLocks noGrp="1"/>
+          </p:cNvSpPr>
+          <p:nvPr>
+            <p:ph type="ftr" sz="quarter" idx="11"/>
+          </p:nvPr>
+        </p:nvSpPr>
+        <p:spPr/>
+        <p:txBody>
+          <a:bodyPr/>
+          <a:lstStyle/>
+          <a:p>
+            <a:r>
+              <a:rPr lang="en-US" smtClean="0"/>
+              <a:t>@domenic</a:t>
+            </a:r>
+            <a:endParaRPr lang="en-US"/>
+          </a:p>
+        </p:txBody>
+      </p:sp>
     </p:spTree>
     <p:extLst>
       <p:ext uri="{BB962C8B-B14F-4D97-AF65-F5344CB8AC3E}">
@@ -25486,6 +26242,29 @@
           </a:p>
         </p:txBody>
       </p:sp>
+      <p:sp>
+        <p:nvSpPr>
+          <p:cNvPr id="3" name="Footer Placeholder 2"/>
+          <p:cNvSpPr>
+            <a:spLocks noGrp="1"/>
+          </p:cNvSpPr>
+          <p:nvPr>
+            <p:ph type="ftr" sz="quarter" idx="11"/>
+          </p:nvPr>
+        </p:nvSpPr>
+        <p:spPr/>
+        <p:txBody>
+          <a:bodyPr/>
+          <a:lstStyle/>
+          <a:p>
+            <a:r>
+              <a:rPr lang="en-US" smtClean="0"/>
+              <a:t>@domenic</a:t>
+            </a:r>
+            <a:endParaRPr lang="en-US"/>
+          </a:p>
+        </p:txBody>
+      </p:sp>
     </p:spTree>
     <p:extLst>
       <p:ext uri="{BB962C8B-B14F-4D97-AF65-F5344CB8AC3E}">
@@ -25592,6 +26371,29 @@
           </a:p>
         </p:txBody>
       </p:sp>
+      <p:sp>
+        <p:nvSpPr>
+          <p:cNvPr id="2" name="Footer Placeholder 1"/>
+          <p:cNvSpPr>
+            <a:spLocks noGrp="1"/>
+          </p:cNvSpPr>
+          <p:nvPr>
+            <p:ph type="ftr" sz="quarter" idx="11"/>
+          </p:nvPr>
+        </p:nvSpPr>
+        <p:spPr/>
+        <p:txBody>
+          <a:bodyPr/>
+          <a:lstStyle/>
+          <a:p>
+            <a:r>
+              <a:rPr lang="en-US" smtClean="0"/>
+              <a:t>@domenic</a:t>
+            </a:r>
+            <a:endParaRPr lang="en-US"/>
+          </a:p>
+        </p:txBody>
+      </p:sp>
     </p:spTree>
     <p:extLst>
       <p:ext uri="{BB962C8B-B14F-4D97-AF65-F5344CB8AC3E}">
@@ -25678,6 +26480,29 @@
           </a:prstGeom>
         </p:spPr>
       </p:pic>
+      <p:sp>
+        <p:nvSpPr>
+          <p:cNvPr id="3" name="Footer Placeholder 2"/>
+          <p:cNvSpPr>
+            <a:spLocks noGrp="1"/>
+          </p:cNvSpPr>
+          <p:nvPr>
+            <p:ph type="ftr" sz="quarter" idx="11"/>
+          </p:nvPr>
+        </p:nvSpPr>
+        <p:spPr/>
+        <p:txBody>
+          <a:bodyPr/>
+          <a:lstStyle/>
+          <a:p>
+            <a:r>
+              <a:rPr lang="en-US" smtClean="0"/>
+              <a:t>@domenic</a:t>
+            </a:r>
+            <a:endParaRPr lang="en-US"/>
+          </a:p>
+        </p:txBody>
+      </p:sp>
     </p:spTree>
     <p:extLst>
       <p:ext uri="{BB962C8B-B14F-4D97-AF65-F5344CB8AC3E}">
@@ -25751,6 +26576,29 @@
           </a:p>
         </p:txBody>
       </p:sp>
+      <p:sp>
+        <p:nvSpPr>
+          <p:cNvPr id="3" name="Footer Placeholder 2"/>
+          <p:cNvSpPr>
+            <a:spLocks noGrp="1"/>
+          </p:cNvSpPr>
+          <p:nvPr>
+            <p:ph type="ftr" sz="quarter" idx="11"/>
+          </p:nvPr>
+        </p:nvSpPr>
+        <p:spPr/>
+        <p:txBody>
+          <a:bodyPr/>
+          <a:lstStyle/>
+          <a:p>
+            <a:r>
+              <a:rPr lang="en-US" smtClean="0"/>
+              <a:t>@domenic</a:t>
+            </a:r>
+            <a:endParaRPr lang="en-US"/>
+          </a:p>
+        </p:txBody>
+      </p:sp>
     </p:spTree>
     <p:extLst>
       <p:ext uri="{BB962C8B-B14F-4D97-AF65-F5344CB8AC3E}">
@@ -25809,6 +26657,29 @@
               <a:t>community</a:t>
             </a:r>
             <a:endParaRPr lang="en-US" dirty="0"/>
+          </a:p>
+        </p:txBody>
+      </p:sp>
+      <p:sp>
+        <p:nvSpPr>
+          <p:cNvPr id="3" name="Footer Placeholder 2"/>
+          <p:cNvSpPr>
+            <a:spLocks noGrp="1"/>
+          </p:cNvSpPr>
+          <p:nvPr>
+            <p:ph type="ftr" sz="quarter" idx="11"/>
+          </p:nvPr>
+        </p:nvSpPr>
+        <p:spPr/>
+        <p:txBody>
+          <a:bodyPr/>
+          <a:lstStyle/>
+          <a:p>
+            <a:r>
+              <a:rPr lang="en-US" smtClean="0"/>
+              <a:t>@domenic</a:t>
+            </a:r>
+            <a:endParaRPr lang="en-US"/>
           </a:p>
         </p:txBody>
       </p:sp>
@@ -25914,6 +26785,29 @@
           </a:prstGeom>
         </p:spPr>
       </p:pic>
+      <p:sp>
+        <p:nvSpPr>
+          <p:cNvPr id="2" name="Footer Placeholder 1"/>
+          <p:cNvSpPr>
+            <a:spLocks noGrp="1"/>
+          </p:cNvSpPr>
+          <p:nvPr>
+            <p:ph type="ftr" sz="quarter" idx="11"/>
+          </p:nvPr>
+        </p:nvSpPr>
+        <p:spPr/>
+        <p:txBody>
+          <a:bodyPr/>
+          <a:lstStyle/>
+          <a:p>
+            <a:r>
+              <a:rPr lang="en-US" smtClean="0"/>
+              <a:t>@domenic</a:t>
+            </a:r>
+            <a:endParaRPr lang="en-US"/>
+          </a:p>
+        </p:txBody>
+      </p:sp>
     </p:spTree>
     <p:extLst>
       <p:ext uri="{BB962C8B-B14F-4D97-AF65-F5344CB8AC3E}">
@@ -25981,6 +26875,29 @@
           </a:p>
         </p:txBody>
       </p:sp>
+      <p:sp>
+        <p:nvSpPr>
+          <p:cNvPr id="3" name="Footer Placeholder 2"/>
+          <p:cNvSpPr>
+            <a:spLocks noGrp="1"/>
+          </p:cNvSpPr>
+          <p:nvPr>
+            <p:ph type="ftr" sz="quarter" idx="11"/>
+          </p:nvPr>
+        </p:nvSpPr>
+        <p:spPr/>
+        <p:txBody>
+          <a:bodyPr/>
+          <a:lstStyle/>
+          <a:p>
+            <a:r>
+              <a:rPr lang="en-US" smtClean="0"/>
+              <a:t>@domenic</a:t>
+            </a:r>
+            <a:endParaRPr lang="en-US"/>
+          </a:p>
+        </p:txBody>
+      </p:sp>
     </p:spTree>
     <p:extLst>
       <p:ext uri="{BB962C8B-B14F-4D97-AF65-F5344CB8AC3E}">
@@ -26067,6 +26984,29 @@
           </a:prstGeom>
         </p:spPr>
       </p:pic>
+      <p:sp>
+        <p:nvSpPr>
+          <p:cNvPr id="3" name="Footer Placeholder 2"/>
+          <p:cNvSpPr>
+            <a:spLocks noGrp="1"/>
+          </p:cNvSpPr>
+          <p:nvPr>
+            <p:ph type="ftr" sz="quarter" idx="11"/>
+          </p:nvPr>
+        </p:nvSpPr>
+        <p:spPr/>
+        <p:txBody>
+          <a:bodyPr/>
+          <a:lstStyle/>
+          <a:p>
+            <a:r>
+              <a:rPr lang="en-US" smtClean="0"/>
+              <a:t>@domenic</a:t>
+            </a:r>
+            <a:endParaRPr lang="en-US"/>
+          </a:p>
+        </p:txBody>
+      </p:sp>
     </p:spTree>
     <p:extLst>
       <p:ext uri="{BB962C8B-B14F-4D97-AF65-F5344CB8AC3E}">
@@ -26181,6 +27121,29 @@
           </a:p>
           <a:p>
             <a:endParaRPr lang="en-US" sz="4800" dirty="0"/>
+          </a:p>
+        </p:txBody>
+      </p:sp>
+      <p:sp>
+        <p:nvSpPr>
+          <p:cNvPr id="2" name="Footer Placeholder 1"/>
+          <p:cNvSpPr>
+            <a:spLocks noGrp="1"/>
+          </p:cNvSpPr>
+          <p:nvPr>
+            <p:ph type="ftr" sz="quarter" idx="11"/>
+          </p:nvPr>
+        </p:nvSpPr>
+        <p:spPr/>
+        <p:txBody>
+          <a:bodyPr/>
+          <a:lstStyle/>
+          <a:p>
+            <a:r>
+              <a:rPr lang="en-US" smtClean="0"/>
+              <a:t>@domenic</a:t>
+            </a:r>
+            <a:endParaRPr lang="en-US"/>
           </a:p>
         </p:txBody>
       </p:sp>
@@ -26513,6 +27476,29 @@
           </a:p>
         </p:txBody>
       </p:sp>
+      <p:sp>
+        <p:nvSpPr>
+          <p:cNvPr id="3" name="Footer Placeholder 2"/>
+          <p:cNvSpPr>
+            <a:spLocks noGrp="1"/>
+          </p:cNvSpPr>
+          <p:nvPr>
+            <p:ph type="ftr" sz="quarter" idx="11"/>
+          </p:nvPr>
+        </p:nvSpPr>
+        <p:spPr/>
+        <p:txBody>
+          <a:bodyPr/>
+          <a:lstStyle/>
+          <a:p>
+            <a:r>
+              <a:rPr lang="en-US" smtClean="0"/>
+              <a:t>@domenic</a:t>
+            </a:r>
+            <a:endParaRPr lang="en-US"/>
+          </a:p>
+        </p:txBody>
+      </p:sp>
     </p:spTree>
     <p:extLst>
       <p:ext uri="{BB962C8B-B14F-4D97-AF65-F5344CB8AC3E}">
@@ -26591,6 +27577,29 @@
           </a:extLst>
         </p:spPr>
       </p:pic>
+      <p:sp>
+        <p:nvSpPr>
+          <p:cNvPr id="2" name="Footer Placeholder 1"/>
+          <p:cNvSpPr>
+            <a:spLocks noGrp="1"/>
+          </p:cNvSpPr>
+          <p:nvPr>
+            <p:ph type="ftr" sz="quarter" idx="11"/>
+          </p:nvPr>
+        </p:nvSpPr>
+        <p:spPr/>
+        <p:txBody>
+          <a:bodyPr/>
+          <a:lstStyle/>
+          <a:p>
+            <a:r>
+              <a:rPr lang="en-US" smtClean="0"/>
+              <a:t>@domenic</a:t>
+            </a:r>
+            <a:endParaRPr lang="en-US"/>
+          </a:p>
+        </p:txBody>
+      </p:sp>
     </p:spTree>
     <p:extLst>
       <p:ext uri="{BB962C8B-B14F-4D97-AF65-F5344CB8AC3E}">
@@ -26836,6 +27845,29 @@
               <a:t>four.livejournal.com/1033160.html</a:t>
             </a:r>
             <a:endParaRPr lang="en-US" dirty="0"/>
+          </a:p>
+        </p:txBody>
+      </p:sp>
+      <p:sp>
+        <p:nvSpPr>
+          <p:cNvPr id="2" name="Footer Placeholder 1"/>
+          <p:cNvSpPr>
+            <a:spLocks noGrp="1"/>
+          </p:cNvSpPr>
+          <p:nvPr>
+            <p:ph type="ftr" sz="quarter" idx="11"/>
+          </p:nvPr>
+        </p:nvSpPr>
+        <p:spPr/>
+        <p:txBody>
+          <a:bodyPr/>
+          <a:lstStyle/>
+          <a:p>
+            <a:r>
+              <a:rPr lang="en-US" smtClean="0"/>
+              <a:t>@domenic</a:t>
+            </a:r>
+            <a:endParaRPr lang="en-US"/>
           </a:p>
         </p:txBody>
       </p:sp>

</xml_diff>

<commit_message>
Add link to GitHub repo to codingTime() slide.
</commit_message>
<xml_diff>
--- a/presentation.pptx
+++ b/presentation.pptx
@@ -26895,6 +26895,49 @@
               <a:t>@domenic</a:t>
             </a:r>
             <a:endParaRPr lang="en-US"/>
+          </a:p>
+        </p:txBody>
+      </p:sp>
+      <p:sp>
+        <p:nvSpPr>
+          <p:cNvPr id="5" name="Rectangle 4"/>
+          <p:cNvSpPr/>
+          <p:nvPr/>
+        </p:nvSpPr>
+        <p:spPr>
+          <a:xfrm>
+            <a:off x="2280860" y="5055087"/>
+            <a:ext cx="5458546" cy="369332"/>
+          </a:xfrm>
+          <a:prstGeom prst="rect">
+            <a:avLst/>
+          </a:prstGeom>
+        </p:spPr>
+        <p:txBody>
+          <a:bodyPr wrap="none">
+            <a:spAutoFit/>
+          </a:bodyPr>
+          <a:lstStyle/>
+          <a:p>
+            <a:r>
+              <a:rPr lang="en-US" dirty="0">
+                <a:hlinkClick r:id="rId2"/>
+              </a:rPr>
+              <a:t>https</a:t>
+            </a:r>
+            <a:r>
+              <a:rPr lang="en-US">
+                <a:hlinkClick r:id="rId2"/>
+              </a:rPr>
+              <a:t>://</a:t>
+            </a:r>
+            <a:r>
+              <a:rPr lang="en-US" smtClean="0">
+                <a:hlinkClick r:id="rId2"/>
+              </a:rPr>
+              <a:t>github.com/domenic/understanding-node</a:t>
+            </a:r>
+            <a:endParaRPr lang="en-US" dirty="0"/>
           </a:p>
         </p:txBody>
       </p:sp>

</xml_diff>

<commit_message>
Add my info to title slide.
</commit_message>
<xml_diff>
--- a/presentation.pptx
+++ b/presentation.pptx
@@ -21145,8 +21145,8 @@
         </p:nvSpPr>
         <p:spPr>
           <a:xfrm>
-            <a:off x="327555" y="6485129"/>
-            <a:ext cx="6297612" cy="365125"/>
+            <a:off x="327555" y="5782079"/>
+            <a:ext cx="6297612" cy="1068176"/>
           </a:xfrm>
         </p:spPr>
         <p:txBody>
@@ -21154,10 +21154,63 @@
           <a:lstStyle/>
           <a:p>
             <a:r>
-              <a:rPr lang="en-US" smtClean="0"/>
-              <a:t>@domenic</a:t>
-            </a:r>
-            <a:endParaRPr lang="en-US"/>
+              <a:rPr lang="en-US" dirty="0" smtClean="0">
+                <a:solidFill>
+                  <a:schemeClr val="tx2">
+                    <a:lumMod val="90000"/>
+                  </a:schemeClr>
+                </a:solidFill>
+              </a:rPr>
+              <a:t>Domenic Denicola</a:t>
+            </a:r>
+          </a:p>
+          <a:p>
+            <a:r>
+              <a:rPr lang="en-US" dirty="0" smtClean="0">
+                <a:solidFill>
+                  <a:schemeClr val="tx2">
+                    <a:lumMod val="90000"/>
+                  </a:schemeClr>
+                </a:solidFill>
+              </a:rPr>
+              <a:t>http://domenicdenicola.com</a:t>
+            </a:r>
+            <a:endParaRPr lang="en-US" dirty="0" smtClean="0">
+              <a:solidFill>
+                <a:schemeClr val="tx2">
+                  <a:lumMod val="90000"/>
+                </a:schemeClr>
+              </a:solidFill>
+            </a:endParaRPr>
+          </a:p>
+          <a:p>
+            <a:r>
+              <a:rPr lang="en-US" dirty="0" smtClean="0">
+                <a:solidFill>
+                  <a:schemeClr val="tx2">
+                    <a:lumMod val="90000"/>
+                  </a:schemeClr>
+                </a:solidFill>
+              </a:rPr>
+              <a:t>@</a:t>
+            </a:r>
+            <a:r>
+              <a:rPr lang="en-US" dirty="0" err="1" smtClean="0">
+                <a:solidFill>
+                  <a:schemeClr val="tx2">
+                    <a:lumMod val="90000"/>
+                  </a:schemeClr>
+                </a:solidFill>
+              </a:rPr>
+              <a:t>domenic</a:t>
+            </a:r>
+            <a:endParaRPr lang="en-US" dirty="0">
+              <a:solidFill>
+                <a:schemeClr val="tx2">
+                  <a:lumMod val="90000"/>
+                </a:schemeClr>
+              </a:solidFill>
+            </a:endParaRPr>
           </a:p>
         </p:txBody>
       </p:sp>
@@ -26923,16 +26976,10 @@
               <a:rPr lang="en-US" dirty="0">
                 <a:hlinkClick r:id="rId2"/>
               </a:rPr>
-              <a:t>https</a:t>
-            </a:r>
-            <a:r>
-              <a:rPr lang="en-US">
-                <a:hlinkClick r:id="rId2"/>
-              </a:rPr>
-              <a:t>://</a:t>
-            </a:r>
-            <a:r>
-              <a:rPr lang="en-US" smtClean="0">
+              <a:t>https://</a:t>
+            </a:r>
+            <a:r>
+              <a:rPr lang="en-US" dirty="0" smtClean="0">
                 <a:hlinkClick r:id="rId2"/>
               </a:rPr>
               <a:t>github.com/domenic/understanding-node</a:t>

</xml_diff>

<commit_message>
Basic touchups from dry-run.
</commit_message>
<xml_diff>
--- a/presentation.pptx
+++ b/presentation.pptx
@@ -21175,13 +21175,6 @@
               </a:rPr>
               <a:t>http://domenicdenicola.com</a:t>
             </a:r>
-            <a:endParaRPr lang="en-US" dirty="0" smtClean="0">
-              <a:solidFill>
-                <a:schemeClr val="tx2">
-                  <a:lumMod val="90000"/>
-                </a:schemeClr>
-              </a:solidFill>
-            </a:endParaRPr>
           </a:p>
           <a:p>
             <a:r>
@@ -25076,7 +25069,7 @@
         <p:spPr>
           <a:xfrm>
             <a:off x="792480" y="2151728"/>
-            <a:ext cx="9438866" cy="2554545"/>
+            <a:ext cx="9551076" cy="2554545"/>
           </a:xfrm>
           <a:prstGeom prst="rect">
             <a:avLst/>
@@ -25115,7 +25108,28 @@
                 <a:latin typeface="Segoe UI Light" panose="020B0502040204020203" pitchFamily="34" charset="0"/>
                 <a:cs typeface="Segoe UI Light" panose="020B0502040204020203" pitchFamily="34" charset="0"/>
               </a:rPr>
-              <a:t>" }, function(err, users) {</a:t>
+              <a:t>" </a:t>
+            </a:r>
+            <a:r>
+              <a:rPr lang="en-US" sz="3200">
+                <a:latin typeface="Segoe UI Light" panose="020B0502040204020203" pitchFamily="34" charset="0"/>
+                <a:cs typeface="Segoe UI Light" panose="020B0502040204020203" pitchFamily="34" charset="0"/>
+              </a:rPr>
+              <a:t>}, </a:t>
+            </a:r>
+            <a:r>
+              <a:rPr lang="en-US" sz="3200" smtClean="0">
+                <a:latin typeface="Segoe UI Light" panose="020B0502040204020203" pitchFamily="34" charset="0"/>
+                <a:cs typeface="Segoe UI Light" panose="020B0502040204020203" pitchFamily="34" charset="0"/>
+              </a:rPr>
+              <a:t>function (</a:t>
+            </a:r>
+            <a:r>
+              <a:rPr lang="en-US" sz="3200" dirty="0">
+                <a:latin typeface="Segoe UI Light" panose="020B0502040204020203" pitchFamily="34" charset="0"/>
+                <a:cs typeface="Segoe UI Light" panose="020B0502040204020203" pitchFamily="34" charset="0"/>
+              </a:rPr>
+              <a:t>err, users) {</a:t>
             </a:r>
           </a:p>
           <a:p>
@@ -27208,6 +27222,7 @@
               <a:rPr lang="en-US" sz="4800" dirty="0" smtClean="0"/>
               <a:t>community</a:t>
             </a:r>
+            <a:endParaRPr lang="en-US" sz="4800" dirty="0" smtClean="0"/>
           </a:p>
           <a:p>
             <a:endParaRPr lang="en-US" sz="4800" dirty="0"/>

</xml_diff>